<commit_message>
Apresentações com links para os protótipos
</commit_message>
<xml_diff>
--- a/PPT-Mae_Gestante-WEB.pptx
+++ b/PPT-Mae_Gestante-WEB.pptx
@@ -2785,7 +2785,7 @@
         <p:spPr>
           <a:xfrm>
             <a:off x="0" y="0"/>
-            <a:ext cx="12187440" cy="6854760"/>
+            <a:ext cx="12187080" cy="6854400"/>
           </a:xfrm>
           <a:prstGeom prst="rect">
             <a:avLst/>
@@ -2808,7 +2808,7 @@
         <p:spPr>
           <a:xfrm>
             <a:off x="0" y="0"/>
-            <a:ext cx="12187440" cy="6854760"/>
+            <a:ext cx="12187080" cy="6854400"/>
           </a:xfrm>
           <a:prstGeom prst="rect">
             <a:avLst/>
@@ -3125,7 +3125,7 @@
         <p:spPr>
           <a:xfrm>
             <a:off x="0" y="0"/>
-            <a:ext cx="12187440" cy="6854760"/>
+            <a:ext cx="12187080" cy="6854400"/>
           </a:xfrm>
           <a:prstGeom prst="rect">
             <a:avLst/>
@@ -3397,7 +3397,7 @@
         <p:spPr>
           <a:xfrm>
             <a:off x="2692440" y="1871280"/>
-            <a:ext cx="6814080" cy="1514160"/>
+            <a:ext cx="6813720" cy="1513800"/>
           </a:xfrm>
           <a:prstGeom prst="rect">
             <a:avLst/>
@@ -3448,7 +3448,7 @@
         <p:spPr>
           <a:xfrm>
             <a:off x="2692440" y="3657600"/>
-            <a:ext cx="6814080" cy="1319400"/>
+            <a:ext cx="6813720" cy="1319040"/>
           </a:xfrm>
           <a:prstGeom prst="rect">
             <a:avLst/>
@@ -3538,7 +3538,7 @@
         <p:spPr>
           <a:xfrm>
             <a:off x="6405840" y="467280"/>
-            <a:ext cx="3930840" cy="1598760"/>
+            <a:ext cx="3930480" cy="1598400"/>
           </a:xfrm>
           <a:prstGeom prst="rect">
             <a:avLst/>
@@ -3589,7 +3589,7 @@
         <p:spPr>
           <a:xfrm>
             <a:off x="6405840" y="2067480"/>
-            <a:ext cx="3930840" cy="3810240"/>
+            <a:ext cx="3930480" cy="3809880"/>
           </a:xfrm>
           <a:prstGeom prst="rect">
             <a:avLst/>
@@ -3610,7 +3610,7 @@
             <a:noAutofit/>
           </a:bodyPr>
           <a:p>
-            <a:pPr marL="216000" indent="-215280" algn="just">
+            <a:pPr marL="216000" indent="-214920" algn="just">
               <a:lnSpc>
                 <a:spcPct val="100000"/>
               </a:lnSpc>
@@ -3636,7 +3636,7 @@
             </a:endParaRPr>
           </a:p>
           <a:p>
-            <a:pPr marL="216000" indent="-215280" algn="just">
+            <a:pPr marL="216000" indent="-214920" algn="just">
               <a:lnSpc>
                 <a:spcPct val="100000"/>
               </a:lnSpc>
@@ -3662,7 +3662,7 @@
             </a:endParaRPr>
           </a:p>
           <a:p>
-            <a:pPr marL="216000" indent="-215280" algn="just">
+            <a:pPr marL="216000" indent="-214920" algn="just">
               <a:lnSpc>
                 <a:spcPct val="100000"/>
               </a:lnSpc>
@@ -3702,7 +3702,7 @@
         <p:spPr>
           <a:xfrm>
             <a:off x="1908360" y="824040"/>
-            <a:ext cx="3232080" cy="5053680"/>
+            <a:ext cx="3231720" cy="5053320"/>
           </a:xfrm>
           <a:prstGeom prst="rect">
             <a:avLst/>
@@ -3751,7 +3751,7 @@
         <p:spPr>
           <a:xfrm>
             <a:off x="6511680" y="467280"/>
-            <a:ext cx="3930840" cy="1598760"/>
+            <a:ext cx="3930480" cy="1598400"/>
           </a:xfrm>
           <a:prstGeom prst="rect">
             <a:avLst/>
@@ -3802,7 +3802,7 @@
         <p:spPr>
           <a:xfrm>
             <a:off x="6511680" y="2067480"/>
-            <a:ext cx="3930840" cy="3810240"/>
+            <a:ext cx="3930480" cy="3809880"/>
           </a:xfrm>
           <a:prstGeom prst="rect">
             <a:avLst/>
@@ -3823,7 +3823,7 @@
             <a:normAutofit/>
           </a:bodyPr>
           <a:p>
-            <a:pPr marL="216000" indent="-215280" algn="just">
+            <a:pPr marL="216000" indent="-214920" algn="just">
               <a:lnSpc>
                 <a:spcPct val="100000"/>
               </a:lnSpc>
@@ -3849,7 +3849,7 @@
             </a:endParaRPr>
           </a:p>
           <a:p>
-            <a:pPr marL="216000" indent="-215280" algn="just">
+            <a:pPr marL="216000" indent="-214920" algn="just">
               <a:lnSpc>
                 <a:spcPct val="100000"/>
               </a:lnSpc>
@@ -3889,7 +3889,7 @@
         <p:spPr>
           <a:xfrm>
             <a:off x="2135160" y="875160"/>
-            <a:ext cx="3048840" cy="5135040"/>
+            <a:ext cx="3048480" cy="5134680"/>
           </a:xfrm>
           <a:prstGeom prst="rect">
             <a:avLst/>
@@ -3938,7 +3938,7 @@
         <p:spPr>
           <a:xfrm>
             <a:off x="6472080" y="717480"/>
-            <a:ext cx="3930840" cy="1598760"/>
+            <a:ext cx="3930480" cy="1598400"/>
           </a:xfrm>
           <a:prstGeom prst="rect">
             <a:avLst/>
@@ -3989,7 +3989,7 @@
         <p:spPr>
           <a:xfrm>
             <a:off x="6312960" y="2222280"/>
-            <a:ext cx="3930840" cy="3810240"/>
+            <a:ext cx="3930480" cy="3809880"/>
           </a:xfrm>
           <a:prstGeom prst="rect">
             <a:avLst/>
@@ -4010,7 +4010,7 @@
             <a:noAutofit/>
           </a:bodyPr>
           <a:p>
-            <a:pPr marL="216000" indent="-215280" algn="just">
+            <a:pPr marL="216000" indent="-214920" algn="just">
               <a:lnSpc>
                 <a:spcPct val="100000"/>
               </a:lnSpc>
@@ -4036,7 +4036,7 @@
             </a:endParaRPr>
           </a:p>
           <a:p>
-            <a:pPr marL="216000" indent="-215280" algn="just">
+            <a:pPr marL="216000" indent="-214920" algn="just">
               <a:lnSpc>
                 <a:spcPct val="100000"/>
               </a:lnSpc>
@@ -4062,7 +4062,7 @@
             </a:endParaRPr>
           </a:p>
           <a:p>
-            <a:pPr marL="216000" indent="-215280" algn="just">
+            <a:pPr marL="216000" indent="-214920" algn="just">
               <a:lnSpc>
                 <a:spcPct val="100000"/>
               </a:lnSpc>
@@ -4102,7 +4102,7 @@
         <p:spPr>
           <a:xfrm>
             <a:off x="1924200" y="717480"/>
-            <a:ext cx="3163320" cy="5315040"/>
+            <a:ext cx="3162960" cy="5314680"/>
           </a:xfrm>
           <a:prstGeom prst="rect">
             <a:avLst/>
@@ -4151,7 +4151,7 @@
         <p:spPr>
           <a:xfrm>
             <a:off x="6246720" y="560160"/>
-            <a:ext cx="3930840" cy="1598760"/>
+            <a:ext cx="3930480" cy="1598400"/>
           </a:xfrm>
           <a:prstGeom prst="rect">
             <a:avLst/>
@@ -4202,7 +4202,7 @@
         <p:spPr>
           <a:xfrm>
             <a:off x="6246720" y="2160360"/>
-            <a:ext cx="3930840" cy="3810240"/>
+            <a:ext cx="3930480" cy="3809880"/>
           </a:xfrm>
           <a:prstGeom prst="rect">
             <a:avLst/>
@@ -4223,7 +4223,7 @@
             <a:noAutofit/>
           </a:bodyPr>
           <a:p>
-            <a:pPr marL="216000" indent="-215280" algn="just">
+            <a:pPr marL="216000" indent="-214920" algn="just">
               <a:lnSpc>
                 <a:spcPct val="100000"/>
               </a:lnSpc>
@@ -4249,7 +4249,7 @@
             </a:endParaRPr>
           </a:p>
           <a:p>
-            <a:pPr marL="216000" indent="-215280" algn="just">
+            <a:pPr marL="216000" indent="-214920" algn="just">
               <a:lnSpc>
                 <a:spcPct val="100000"/>
               </a:lnSpc>
@@ -4289,7 +4289,7 @@
         <p:spPr>
           <a:xfrm>
             <a:off x="1669680" y="811800"/>
-            <a:ext cx="3260880" cy="5256000"/>
+            <a:ext cx="3260520" cy="5255640"/>
           </a:xfrm>
           <a:prstGeom prst="rect">
             <a:avLst/>
@@ -4338,7 +4338,7 @@
         <p:spPr>
           <a:xfrm>
             <a:off x="6458760" y="599760"/>
-            <a:ext cx="3930840" cy="1598760"/>
+            <a:ext cx="3930480" cy="1598400"/>
           </a:xfrm>
           <a:prstGeom prst="rect">
             <a:avLst/>
@@ -4389,7 +4389,7 @@
         <p:spPr>
           <a:xfrm>
             <a:off x="6458760" y="2067480"/>
-            <a:ext cx="3930840" cy="3810240"/>
+            <a:ext cx="3930480" cy="3809880"/>
           </a:xfrm>
           <a:prstGeom prst="rect">
             <a:avLst/>
@@ -4410,7 +4410,7 @@
             <a:noAutofit/>
           </a:bodyPr>
           <a:p>
-            <a:pPr marL="216000" indent="-215280" algn="just">
+            <a:pPr marL="216000" indent="-214920" algn="just">
               <a:lnSpc>
                 <a:spcPct val="100000"/>
               </a:lnSpc>
@@ -4436,7 +4436,7 @@
             </a:endParaRPr>
           </a:p>
           <a:p>
-            <a:pPr marL="216000" indent="-215280" algn="just">
+            <a:pPr marL="216000" indent="-214920" algn="just">
               <a:lnSpc>
                 <a:spcPct val="100000"/>
               </a:lnSpc>
@@ -4476,7 +4476,7 @@
         <p:spPr>
           <a:xfrm>
             <a:off x="2135520" y="708480"/>
-            <a:ext cx="3036240" cy="5306760"/>
+            <a:ext cx="3035880" cy="5306400"/>
           </a:xfrm>
           <a:prstGeom prst="rect">
             <a:avLst/>
@@ -4525,7 +4525,7 @@
         <p:spPr>
           <a:xfrm>
             <a:off x="6418800" y="613080"/>
-            <a:ext cx="3930840" cy="1598760"/>
+            <a:ext cx="3930480" cy="1598400"/>
           </a:xfrm>
           <a:prstGeom prst="rect">
             <a:avLst/>
@@ -4576,7 +4576,7 @@
         <p:spPr>
           <a:xfrm>
             <a:off x="6418800" y="2067480"/>
-            <a:ext cx="3930840" cy="3810240"/>
+            <a:ext cx="3930480" cy="3809880"/>
           </a:xfrm>
           <a:prstGeom prst="rect">
             <a:avLst/>
@@ -4597,7 +4597,7 @@
             <a:noAutofit/>
           </a:bodyPr>
           <a:p>
-            <a:pPr marL="216000" indent="-215280" algn="just">
+            <a:pPr marL="216000" indent="-214920" algn="just">
               <a:lnSpc>
                 <a:spcPct val="100000"/>
               </a:lnSpc>
@@ -4637,7 +4637,7 @@
         <p:spPr>
           <a:xfrm>
             <a:off x="1940760" y="780840"/>
-            <a:ext cx="3146760" cy="5096880"/>
+            <a:ext cx="3146400" cy="5096520"/>
           </a:xfrm>
           <a:prstGeom prst="rect">
             <a:avLst/>
@@ -4686,7 +4686,7 @@
         <p:spPr>
           <a:xfrm>
             <a:off x="6564600" y="560160"/>
-            <a:ext cx="3930840" cy="1598760"/>
+            <a:ext cx="3930480" cy="1598400"/>
           </a:xfrm>
           <a:prstGeom prst="rect">
             <a:avLst/>
@@ -4737,7 +4737,7 @@
         <p:spPr>
           <a:xfrm>
             <a:off x="6564600" y="2067480"/>
-            <a:ext cx="3930840" cy="3810240"/>
+            <a:ext cx="3930480" cy="3809880"/>
           </a:xfrm>
           <a:prstGeom prst="rect">
             <a:avLst/>
@@ -4758,7 +4758,7 @@
             <a:noAutofit/>
           </a:bodyPr>
           <a:p>
-            <a:pPr marL="216000" indent="-215280" algn="just">
+            <a:pPr marL="216000" indent="-214920" algn="just">
               <a:lnSpc>
                 <a:spcPct val="100000"/>
               </a:lnSpc>
@@ -4784,7 +4784,7 @@
             </a:endParaRPr>
           </a:p>
           <a:p>
-            <a:pPr marL="216000" indent="-215280" algn="just">
+            <a:pPr marL="216000" indent="-214920" algn="just">
               <a:lnSpc>
                 <a:spcPct val="100000"/>
               </a:lnSpc>
@@ -4824,7 +4824,7 @@
         <p:spPr>
           <a:xfrm>
             <a:off x="2027520" y="779760"/>
-            <a:ext cx="3086280" cy="5227560"/>
+            <a:ext cx="3085920" cy="5227200"/>
           </a:xfrm>
           <a:prstGeom prst="rect">
             <a:avLst/>
@@ -4873,7 +4873,7 @@
         <p:spPr>
           <a:xfrm>
             <a:off x="6564600" y="560160"/>
-            <a:ext cx="3930840" cy="1598760"/>
+            <a:ext cx="3930480" cy="1598400"/>
           </a:xfrm>
           <a:prstGeom prst="rect">
             <a:avLst/>
@@ -4924,7 +4924,7 @@
         <p:spPr>
           <a:xfrm>
             <a:off x="6564600" y="2067480"/>
-            <a:ext cx="3930840" cy="3810240"/>
+            <a:ext cx="3930480" cy="3809880"/>
           </a:xfrm>
           <a:prstGeom prst="rect">
             <a:avLst/>
@@ -4945,7 +4945,7 @@
             <a:noAutofit/>
           </a:bodyPr>
           <a:p>
-            <a:pPr marL="216000" indent="-215280" algn="just">
+            <a:pPr marL="216000" indent="-214920" algn="just">
               <a:lnSpc>
                 <a:spcPct val="100000"/>
               </a:lnSpc>
@@ -4985,7 +4985,7 @@
         <p:spPr>
           <a:xfrm>
             <a:off x="2027520" y="779760"/>
-            <a:ext cx="3086280" cy="5227560"/>
+            <a:ext cx="3085920" cy="5227200"/>
           </a:xfrm>
           <a:prstGeom prst="rect">
             <a:avLst/>
@@ -5034,7 +5034,7 @@
         <p:spPr>
           <a:xfrm>
             <a:off x="6564600" y="560160"/>
-            <a:ext cx="3930840" cy="1598760"/>
+            <a:ext cx="3930480" cy="1598400"/>
           </a:xfrm>
           <a:prstGeom prst="rect">
             <a:avLst/>
@@ -5085,7 +5085,7 @@
         <p:spPr>
           <a:xfrm>
             <a:off x="6564600" y="2067480"/>
-            <a:ext cx="3930840" cy="3810240"/>
+            <a:ext cx="3930480" cy="3809880"/>
           </a:xfrm>
           <a:prstGeom prst="rect">
             <a:avLst/>
@@ -5106,7 +5106,7 @@
             <a:noAutofit/>
           </a:bodyPr>
           <a:p>
-            <a:pPr marL="216000" indent="-215280" algn="just">
+            <a:pPr marL="216000" indent="-214920" algn="just">
               <a:lnSpc>
                 <a:spcPct val="100000"/>
               </a:lnSpc>
@@ -5146,7 +5146,7 @@
         <p:spPr>
           <a:xfrm>
             <a:off x="2027520" y="779760"/>
-            <a:ext cx="3086280" cy="5227560"/>
+            <a:ext cx="3085920" cy="5227200"/>
           </a:xfrm>
           <a:prstGeom prst="rect">
             <a:avLst/>
@@ -5195,7 +5195,7 @@
         <p:spPr>
           <a:xfrm>
             <a:off x="1296000" y="560160"/>
-            <a:ext cx="9647280" cy="1598760"/>
+            <a:ext cx="9646920" cy="1598400"/>
           </a:xfrm>
           <a:prstGeom prst="rect">
             <a:avLst/>
@@ -5246,7 +5246,7 @@
         <p:spPr>
           <a:xfrm>
             <a:off x="1296000" y="2067480"/>
-            <a:ext cx="9647280" cy="3810240"/>
+            <a:ext cx="9646920" cy="3809880"/>
           </a:xfrm>
           <a:prstGeom prst="rect">
             <a:avLst/>
@@ -5327,7 +5327,7 @@
         <p:spPr>
           <a:xfrm>
             <a:off x="6863400" y="732240"/>
-            <a:ext cx="3465720" cy="1360080"/>
+            <a:ext cx="3465360" cy="1359720"/>
           </a:xfrm>
           <a:prstGeom prst="rect">
             <a:avLst/>
@@ -5378,7 +5378,7 @@
         <p:spPr>
           <a:xfrm>
             <a:off x="6630840" y="2424240"/>
-            <a:ext cx="3930840" cy="2675160"/>
+            <a:ext cx="3930480" cy="2674800"/>
           </a:xfrm>
           <a:prstGeom prst="rect">
             <a:avLst/>
@@ -5399,7 +5399,7 @@
             <a:normAutofit/>
           </a:bodyPr>
           <a:p>
-            <a:pPr marL="216000" indent="-215280" algn="just">
+            <a:pPr marL="216000" indent="-214920" algn="just">
               <a:lnSpc>
                 <a:spcPct val="100000"/>
               </a:lnSpc>
@@ -5439,7 +5439,7 @@
         <p:spPr>
           <a:xfrm>
             <a:off x="2024280" y="872280"/>
-            <a:ext cx="3106800" cy="5208840"/>
+            <a:ext cx="3106440" cy="5208480"/>
           </a:xfrm>
           <a:prstGeom prst="rect">
             <a:avLst/>
@@ -5488,7 +5488,7 @@
         <p:spPr>
           <a:xfrm>
             <a:off x="1296000" y="560160"/>
-            <a:ext cx="9647280" cy="1598760"/>
+            <a:ext cx="9646920" cy="1598400"/>
           </a:xfrm>
           <a:prstGeom prst="rect">
             <a:avLst/>
@@ -5539,7 +5539,7 @@
         <p:spPr>
           <a:xfrm>
             <a:off x="1296000" y="2067480"/>
-            <a:ext cx="9647280" cy="3810240"/>
+            <a:ext cx="9646920" cy="3809880"/>
           </a:xfrm>
           <a:prstGeom prst="rect">
             <a:avLst/>
@@ -5573,7 +5573,7 @@
                 <a:latin typeface="Arial"/>
                 <a:ea typeface="Noto Sans CJK SC"/>
               </a:rPr>
-              <a:t>Sistema ‘Web’ do projeto para o terceiro setor denominado ‘Mãe Gestante’. Com todas a páginas básicas do MVC, além das que recebem redirecionamento pelo ‘App’. Que, utiliza um banco de dados relacional. Esse banco deve alimentar uma ‘Api’ e as páginas do próprio sistema ‘Web’.</a:t>
+              <a:t>https://viewer.diagrams.net/?tags=%7B%7D&amp;highlight=0000ff&amp;edit=_blank&amp;layers=1&amp;nav=1&amp;title=Mae_Gestante-Web.drawio#Uhttps%3A%2F%2Fraw.githubusercontent.com%2Fdouggonsouza%2Fmae_gestante%2Fmain%2FMae_Gestante-Web.drawio</a:t>
             </a:r>
             <a:endParaRPr b="0" lang="pt-BR" sz="1800" spc="-1" strike="noStrike">
               <a:latin typeface="Arial"/>
@@ -5620,7 +5620,7 @@
         <p:spPr>
           <a:xfrm>
             <a:off x="2692440" y="1871280"/>
-            <a:ext cx="6814080" cy="1514160"/>
+            <a:ext cx="6813720" cy="1513800"/>
           </a:xfrm>
           <a:prstGeom prst="rect">
             <a:avLst/>
@@ -5671,7 +5671,7 @@
         <p:spPr>
           <a:xfrm>
             <a:off x="2692440" y="3511800"/>
-            <a:ext cx="6814080" cy="1774440"/>
+            <a:ext cx="6813720" cy="1774080"/>
           </a:xfrm>
           <a:prstGeom prst="rect">
             <a:avLst/>
@@ -5933,7 +5933,7 @@
         <p:spPr>
           <a:xfrm>
             <a:off x="6657480" y="608760"/>
-            <a:ext cx="3930840" cy="1598760"/>
+            <a:ext cx="3930480" cy="1598400"/>
           </a:xfrm>
           <a:prstGeom prst="rect">
             <a:avLst/>
@@ -5984,7 +5984,7 @@
         <p:spPr>
           <a:xfrm>
             <a:off x="6657480" y="2208960"/>
-            <a:ext cx="3930840" cy="3810240"/>
+            <a:ext cx="3930480" cy="3809880"/>
           </a:xfrm>
           <a:prstGeom prst="rect">
             <a:avLst/>
@@ -6005,7 +6005,7 @@
             <a:noAutofit/>
           </a:bodyPr>
           <a:p>
-            <a:pPr marL="216000" indent="-215280" algn="just">
+            <a:pPr marL="216000" indent="-214920" algn="just">
               <a:lnSpc>
                 <a:spcPct val="100000"/>
               </a:lnSpc>
@@ -6045,7 +6045,7 @@
         <p:spPr>
           <a:xfrm>
             <a:off x="2213280" y="772200"/>
-            <a:ext cx="2980080" cy="5247000"/>
+            <a:ext cx="2979720" cy="5246640"/>
           </a:xfrm>
           <a:prstGeom prst="rect">
             <a:avLst/>
@@ -6094,7 +6094,7 @@
         <p:spPr>
           <a:xfrm>
             <a:off x="6617880" y="573480"/>
-            <a:ext cx="3930840" cy="1598760"/>
+            <a:ext cx="3930480" cy="1598400"/>
           </a:xfrm>
           <a:prstGeom prst="rect">
             <a:avLst/>
@@ -6145,7 +6145,7 @@
         <p:spPr>
           <a:xfrm>
             <a:off x="6617880" y="2173680"/>
-            <a:ext cx="3930840" cy="3810240"/>
+            <a:ext cx="3930480" cy="3809880"/>
           </a:xfrm>
           <a:prstGeom prst="rect">
             <a:avLst/>
@@ -6166,7 +6166,7 @@
             <a:noAutofit/>
           </a:bodyPr>
           <a:p>
-            <a:pPr marL="216000" indent="-215280" algn="just">
+            <a:pPr marL="216000" indent="-214920" algn="just">
               <a:lnSpc>
                 <a:spcPct val="100000"/>
               </a:lnSpc>
@@ -6206,7 +6206,7 @@
         <p:spPr>
           <a:xfrm>
             <a:off x="1974600" y="705960"/>
-            <a:ext cx="3046680" cy="5522760"/>
+            <a:ext cx="3046320" cy="5522400"/>
           </a:xfrm>
           <a:prstGeom prst="rect">
             <a:avLst/>
@@ -6255,7 +6255,7 @@
         <p:spPr>
           <a:xfrm>
             <a:off x="6684120" y="560160"/>
-            <a:ext cx="3930840" cy="1598760"/>
+            <a:ext cx="3930480" cy="1598400"/>
           </a:xfrm>
           <a:prstGeom prst="rect">
             <a:avLst/>
@@ -6316,7 +6316,7 @@
         <p:spPr>
           <a:xfrm>
             <a:off x="6684120" y="2067480"/>
-            <a:ext cx="3930840" cy="3810240"/>
+            <a:ext cx="3930480" cy="3809880"/>
           </a:xfrm>
           <a:prstGeom prst="rect">
             <a:avLst/>
@@ -6337,7 +6337,7 @@
             <a:noAutofit/>
           </a:bodyPr>
           <a:p>
-            <a:pPr marL="216000" indent="-215280" algn="just">
+            <a:pPr marL="216000" indent="-214920" algn="just">
               <a:lnSpc>
                 <a:spcPct val="100000"/>
               </a:lnSpc>
@@ -6363,7 +6363,7 @@
             </a:endParaRPr>
           </a:p>
           <a:p>
-            <a:pPr marL="216000" indent="-215280" algn="just">
+            <a:pPr marL="216000" indent="-214920" algn="just">
               <a:lnSpc>
                 <a:spcPct val="100000"/>
               </a:lnSpc>
@@ -6403,7 +6403,7 @@
         <p:spPr>
           <a:xfrm>
             <a:off x="2169720" y="706680"/>
-            <a:ext cx="3286440" cy="5441040"/>
+            <a:ext cx="3286080" cy="5440680"/>
           </a:xfrm>
           <a:prstGeom prst="rect">
             <a:avLst/>
@@ -6452,7 +6452,7 @@
         <p:spPr>
           <a:xfrm>
             <a:off x="6432120" y="653040"/>
-            <a:ext cx="3930840" cy="1598760"/>
+            <a:ext cx="3930480" cy="1598400"/>
           </a:xfrm>
           <a:prstGeom prst="rect">
             <a:avLst/>
@@ -6513,7 +6513,7 @@
         <p:spPr>
           <a:xfrm>
             <a:off x="6432120" y="2054160"/>
-            <a:ext cx="3930840" cy="3810240"/>
+            <a:ext cx="3930480" cy="3809880"/>
           </a:xfrm>
           <a:prstGeom prst="rect">
             <a:avLst/>
@@ -6534,7 +6534,7 @@
             <a:noAutofit/>
           </a:bodyPr>
           <a:p>
-            <a:pPr marL="216000" indent="-215280" algn="just">
+            <a:pPr marL="216000" indent="-214920" algn="just">
               <a:lnSpc>
                 <a:spcPct val="100000"/>
               </a:lnSpc>
@@ -6560,7 +6560,7 @@
             </a:endParaRPr>
           </a:p>
           <a:p>
-            <a:pPr marL="216000" indent="-215280" algn="just">
+            <a:pPr marL="216000" indent="-214920" algn="just">
               <a:lnSpc>
                 <a:spcPct val="100000"/>
               </a:lnSpc>
@@ -6586,7 +6586,7 @@
             </a:endParaRPr>
           </a:p>
           <a:p>
-            <a:pPr marL="216000" indent="-215280" algn="just">
+            <a:pPr marL="216000" indent="-214920" algn="just">
               <a:lnSpc>
                 <a:spcPct val="100000"/>
               </a:lnSpc>
@@ -6626,7 +6626,7 @@
         <p:spPr>
           <a:xfrm>
             <a:off x="2024280" y="745920"/>
-            <a:ext cx="3074040" cy="5361840"/>
+            <a:ext cx="3073680" cy="5361480"/>
           </a:xfrm>
           <a:prstGeom prst="rect">
             <a:avLst/>
@@ -6675,7 +6675,7 @@
         <p:spPr>
           <a:xfrm>
             <a:off x="6233400" y="520200"/>
-            <a:ext cx="3930840" cy="1598760"/>
+            <a:ext cx="3930480" cy="1598400"/>
           </a:xfrm>
           <a:prstGeom prst="rect">
             <a:avLst/>
@@ -6726,7 +6726,7 @@
         <p:spPr>
           <a:xfrm>
             <a:off x="6233400" y="2218320"/>
-            <a:ext cx="3930840" cy="3810240"/>
+            <a:ext cx="3930480" cy="3809880"/>
           </a:xfrm>
           <a:prstGeom prst="rect">
             <a:avLst/>
@@ -6747,7 +6747,7 @@
             <a:noAutofit/>
           </a:bodyPr>
           <a:p>
-            <a:pPr marL="216000" indent="-215280" algn="just">
+            <a:pPr marL="216000" indent="-214920" algn="just">
               <a:lnSpc>
                 <a:spcPct val="100000"/>
               </a:lnSpc>
@@ -6773,7 +6773,7 @@
             </a:endParaRPr>
           </a:p>
           <a:p>
-            <a:pPr marL="216000" indent="-215280" algn="just">
+            <a:pPr marL="216000" indent="-214920" algn="just">
               <a:lnSpc>
                 <a:spcPct val="100000"/>
               </a:lnSpc>
@@ -6813,7 +6813,7 @@
         <p:spPr>
           <a:xfrm>
             <a:off x="1776600" y="785520"/>
-            <a:ext cx="3204720" cy="5469480"/>
+            <a:ext cx="3204360" cy="5469120"/>
           </a:xfrm>
           <a:prstGeom prst="rect">
             <a:avLst/>
@@ -6862,7 +6862,7 @@
         <p:spPr>
           <a:xfrm>
             <a:off x="6538320" y="467280"/>
-            <a:ext cx="3930840" cy="1598760"/>
+            <a:ext cx="3930480" cy="1598400"/>
           </a:xfrm>
           <a:prstGeom prst="rect">
             <a:avLst/>
@@ -6913,7 +6913,7 @@
         <p:spPr>
           <a:xfrm>
             <a:off x="6538320" y="2067480"/>
-            <a:ext cx="3930840" cy="3810240"/>
+            <a:ext cx="3930480" cy="3809880"/>
           </a:xfrm>
           <a:prstGeom prst="rect">
             <a:avLst/>
@@ -6934,7 +6934,7 @@
             <a:noAutofit/>
           </a:bodyPr>
           <a:p>
-            <a:pPr marL="216000" indent="-215280" algn="just">
+            <a:pPr marL="216000" indent="-214920" algn="just">
               <a:lnSpc>
                 <a:spcPct val="100000"/>
               </a:lnSpc>
@@ -6960,7 +6960,7 @@
             </a:endParaRPr>
           </a:p>
           <a:p>
-            <a:pPr marL="216000" indent="-215280" algn="just">
+            <a:pPr marL="216000" indent="-214920" algn="just">
               <a:lnSpc>
                 <a:spcPct val="100000"/>
               </a:lnSpc>
@@ -7000,7 +7000,7 @@
         <p:spPr>
           <a:xfrm>
             <a:off x="2028960" y="786240"/>
-            <a:ext cx="2992320" cy="5303520"/>
+            <a:ext cx="2991960" cy="5303160"/>
           </a:xfrm>
           <a:prstGeom prst="rect">
             <a:avLst/>
@@ -7049,7 +7049,7 @@
         <p:spPr>
           <a:xfrm>
             <a:off x="6525000" y="467280"/>
-            <a:ext cx="3930840" cy="1598760"/>
+            <a:ext cx="3930480" cy="1598400"/>
           </a:xfrm>
           <a:prstGeom prst="rect">
             <a:avLst/>
@@ -7100,7 +7100,7 @@
         <p:spPr>
           <a:xfrm>
             <a:off x="6525000" y="2067480"/>
-            <a:ext cx="3930840" cy="3810240"/>
+            <a:ext cx="3930480" cy="3809880"/>
           </a:xfrm>
           <a:prstGeom prst="rect">
             <a:avLst/>
@@ -7121,7 +7121,7 @@
             <a:noAutofit/>
           </a:bodyPr>
           <a:p>
-            <a:pPr marL="216000" indent="-215280" algn="just">
+            <a:pPr marL="216000" indent="-214920" algn="just">
               <a:lnSpc>
                 <a:spcPct val="100000"/>
               </a:lnSpc>
@@ -7161,7 +7161,7 @@
         <p:spPr>
           <a:xfrm>
             <a:off x="2112840" y="838440"/>
-            <a:ext cx="3067200" cy="5305320"/>
+            <a:ext cx="3066840" cy="5304960"/>
           </a:xfrm>
           <a:prstGeom prst="rect">
             <a:avLst/>

</xml_diff>